<commit_message>
Carpeta de la presentación
</commit_message>
<xml_diff>
--- a/Presentación/Marturet_Presentacion_RumboSustentable.pptx
+++ b/Presentación/Marturet_Presentacion_RumboSustentable.pptx
@@ -14,6 +14,7 @@
     <p:sldId id="263" r:id="rId8"/>
     <p:sldId id="264" r:id="rId9"/>
     <p:sldId id="265" r:id="rId10"/>
+    <p:sldId id="266" r:id="rId11"/>
   </p:sldIdLst>
   <p:sldSz cx="12192000" cy="6858000"/>
   <p:notesSz cx="6858000" cy="9144000"/>
@@ -6892,6 +6893,225 @@
 </p:sld>
 </file>
 
+<file path=ppt/slides/slide10.xml><?xml version="1.0" encoding="utf-8"?>
+<p:sld xmlns:a="http://schemas.openxmlformats.org/drawingml/2006/main" xmlns:r="http://schemas.openxmlformats.org/officeDocument/2006/relationships" xmlns:p="http://schemas.openxmlformats.org/presentationml/2006/main">
+  <p:cSld>
+    <p:spTree>
+      <p:nvGrpSpPr>
+        <p:cNvPr id="1" name=""/>
+        <p:cNvGrpSpPr/>
+        <p:nvPr/>
+      </p:nvGrpSpPr>
+      <p:grpSpPr>
+        <a:xfrm>
+          <a:off x="0" y="0"/>
+          <a:ext cx="0" cy="0"/>
+          <a:chOff x="0" y="0"/>
+          <a:chExt cx="0" cy="0"/>
+        </a:xfrm>
+      </p:grpSpPr>
+      <p:sp>
+        <p:nvSpPr>
+          <p:cNvPr id="2" name="Título 1">
+            <a:extLst>
+              <a:ext uri="{FF2B5EF4-FFF2-40B4-BE49-F238E27FC236}">
+                <a16:creationId xmlns:a16="http://schemas.microsoft.com/office/drawing/2014/main" id="{E3A3B9B9-C255-F096-A78E-A3EFFCD3259B}"/>
+              </a:ext>
+            </a:extLst>
+          </p:cNvPr>
+          <p:cNvSpPr>
+            <a:spLocks noGrp="1"/>
+          </p:cNvSpPr>
+          <p:nvPr>
+            <p:ph type="title"/>
+          </p:nvPr>
+        </p:nvSpPr>
+        <p:spPr/>
+        <p:txBody>
+          <a:bodyPr/>
+          <a:lstStyle/>
+          <a:p>
+            <a:pPr algn="ctr"/>
+            <a:r>
+              <a:rPr lang="es-AR" dirty="0"/>
+              <a:t>Rumbo sustentable</a:t>
+            </a:r>
+          </a:p>
+        </p:txBody>
+      </p:sp>
+      <p:sp>
+        <p:nvSpPr>
+          <p:cNvPr id="3" name="Marcador de contenido 2">
+            <a:extLst>
+              <a:ext uri="{FF2B5EF4-FFF2-40B4-BE49-F238E27FC236}">
+                <a16:creationId xmlns:a16="http://schemas.microsoft.com/office/drawing/2014/main" id="{3787738E-29AE-D3CA-2F18-7DEF035CC8FB}"/>
+              </a:ext>
+            </a:extLst>
+          </p:cNvPr>
+          <p:cNvSpPr>
+            <a:spLocks noGrp="1"/>
+          </p:cNvSpPr>
+          <p:nvPr>
+            <p:ph idx="1"/>
+          </p:nvPr>
+        </p:nvSpPr>
+        <p:spPr>
+          <a:xfrm>
+            <a:off x="1251678" y="1556085"/>
+            <a:ext cx="10178322" cy="4323508"/>
+          </a:xfrm>
+        </p:spPr>
+        <p:txBody>
+          <a:bodyPr>
+            <a:normAutofit/>
+          </a:bodyPr>
+          <a:lstStyle/>
+          <a:p>
+            <a:pPr marL="0" lvl="0" indent="0" algn="just">
+              <a:lnSpc>
+                <a:spcPct val="150000"/>
+              </a:lnSpc>
+              <a:spcBef>
+                <a:spcPts val="0"/>
+              </a:spcBef>
+              <a:buNone/>
+            </a:pPr>
+            <a:r>
+              <a:rPr lang="es-AR" b="1" u="sng" dirty="0">
+                <a:effectLst/>
+                <a:latin typeface="Calibri" panose="020F0502020204030204" pitchFamily="34" charset="0"/>
+                <a:ea typeface="Times New Roman" panose="02020603050405020304" pitchFamily="18" charset="0"/>
+                <a:cs typeface="Times New Roman" panose="02020603050405020304" pitchFamily="18" charset="0"/>
+              </a:rPr>
+              <a:t>Utilización de Datos Abiertos del Portal de Corrientes:</a:t>
+            </a:r>
+          </a:p>
+          <a:p>
+            <a:pPr marL="0" lvl="0" indent="0" algn="just">
+              <a:lnSpc>
+                <a:spcPct val="150000"/>
+              </a:lnSpc>
+              <a:spcBef>
+                <a:spcPts val="0"/>
+              </a:spcBef>
+              <a:buNone/>
+            </a:pPr>
+            <a:r>
+              <a:rPr lang="es-AR" dirty="0">
+                <a:effectLst/>
+                <a:latin typeface="Calibri" panose="020F0502020204030204" pitchFamily="34" charset="0"/>
+                <a:ea typeface="Times New Roman" panose="02020603050405020304" pitchFamily="18" charset="0"/>
+                <a:cs typeface="Times New Roman" panose="02020603050405020304" pitchFamily="18" charset="0"/>
+                <a:hlinkClick r:id="rId2"/>
+              </a:rPr>
+              <a:t>https://datos.ciudaddecorrientes.gov.ar</a:t>
+            </a:r>
+            <a:endParaRPr lang="es-AR" dirty="0">
+              <a:latin typeface="Calibri" panose="020F0502020204030204" pitchFamily="34" charset="0"/>
+              <a:ea typeface="Times New Roman" panose="02020603050405020304" pitchFamily="18" charset="0"/>
+              <a:cs typeface="Times New Roman" panose="02020603050405020304" pitchFamily="18" charset="0"/>
+            </a:endParaRPr>
+          </a:p>
+          <a:p>
+            <a:pPr marL="0" lvl="0" indent="0" algn="just">
+              <a:lnSpc>
+                <a:spcPct val="150000"/>
+              </a:lnSpc>
+              <a:spcBef>
+                <a:spcPts val="0"/>
+              </a:spcBef>
+              <a:buNone/>
+            </a:pPr>
+            <a:endParaRPr lang="es-AR" b="1" u="sng" dirty="0">
+              <a:effectLst/>
+              <a:latin typeface="Calibri" panose="020F0502020204030204" pitchFamily="34" charset="0"/>
+              <a:ea typeface="Times New Roman" panose="02020603050405020304" pitchFamily="18" charset="0"/>
+              <a:cs typeface="Times New Roman" panose="02020603050405020304" pitchFamily="18" charset="0"/>
+            </a:endParaRPr>
+          </a:p>
+          <a:p>
+            <a:pPr marL="0" lvl="0" indent="0" algn="just">
+              <a:lnSpc>
+                <a:spcPct val="150000"/>
+              </a:lnSpc>
+              <a:spcBef>
+                <a:spcPts val="0"/>
+              </a:spcBef>
+              <a:buNone/>
+            </a:pPr>
+            <a:r>
+              <a:rPr lang="es-AR" b="1" u="sng" dirty="0">
+                <a:effectLst/>
+                <a:latin typeface="Calibri" panose="020F0502020204030204" pitchFamily="34" charset="0"/>
+                <a:ea typeface="Times New Roman" panose="02020603050405020304" pitchFamily="18" charset="0"/>
+                <a:cs typeface="Times New Roman" panose="02020603050405020304" pitchFamily="18" charset="0"/>
+              </a:rPr>
+              <a:t>Acceso a mi repositorio de </a:t>
+            </a:r>
+            <a:r>
+              <a:rPr lang="es-AR" b="1" u="sng" dirty="0" err="1">
+                <a:effectLst/>
+                <a:latin typeface="Calibri" panose="020F0502020204030204" pitchFamily="34" charset="0"/>
+                <a:ea typeface="Times New Roman" panose="02020603050405020304" pitchFamily="18" charset="0"/>
+                <a:cs typeface="Times New Roman" panose="02020603050405020304" pitchFamily="18" charset="0"/>
+              </a:rPr>
+              <a:t>Github</a:t>
+            </a:r>
+            <a:r>
+              <a:rPr lang="es-AR" b="1" u="sng" dirty="0">
+                <a:effectLst/>
+                <a:latin typeface="Calibri" panose="020F0502020204030204" pitchFamily="34" charset="0"/>
+                <a:ea typeface="Times New Roman" panose="02020603050405020304" pitchFamily="18" charset="0"/>
+                <a:cs typeface="Times New Roman" panose="02020603050405020304" pitchFamily="18" charset="0"/>
+              </a:rPr>
+              <a:t>:</a:t>
+            </a:r>
+          </a:p>
+          <a:p>
+            <a:pPr marL="0" lvl="0" indent="0" algn="just">
+              <a:lnSpc>
+                <a:spcPct val="150000"/>
+              </a:lnSpc>
+              <a:spcBef>
+                <a:spcPts val="0"/>
+              </a:spcBef>
+              <a:buNone/>
+            </a:pPr>
+            <a:r>
+              <a:rPr lang="es-AR" dirty="0">
+                <a:effectLst/>
+                <a:latin typeface="Calibri" panose="020F0502020204030204" pitchFamily="34" charset="0"/>
+                <a:ea typeface="Times New Roman" panose="02020603050405020304" pitchFamily="18" charset="0"/>
+                <a:cs typeface="Times New Roman" panose="02020603050405020304" pitchFamily="18" charset="0"/>
+                <a:hlinkClick r:id="rId3"/>
+              </a:rPr>
+              <a:t>https://github.com/caromarturet/Repo-CumbredeDatos</a:t>
+            </a:r>
+            <a:r>
+              <a:rPr lang="es-AR" dirty="0">
+                <a:effectLst/>
+                <a:latin typeface="Calibri" panose="020F0502020204030204" pitchFamily="34" charset="0"/>
+                <a:ea typeface="Times New Roman" panose="02020603050405020304" pitchFamily="18" charset="0"/>
+                <a:cs typeface="Times New Roman" panose="02020603050405020304" pitchFamily="18" charset="0"/>
+              </a:rPr>
+              <a:t> </a:t>
+            </a:r>
+          </a:p>
+        </p:txBody>
+      </p:sp>
+    </p:spTree>
+    <p:extLst>
+      <p:ext uri="{BB962C8B-B14F-4D97-AF65-F5344CB8AC3E}">
+        <p14:creationId xmlns:p14="http://schemas.microsoft.com/office/powerpoint/2010/main" val="3957907842"/>
+      </p:ext>
+    </p:extLst>
+  </p:cSld>
+  <p:clrMapOvr>
+    <a:masterClrMapping/>
+  </p:clrMapOvr>
+</p:sld>
+</file>
+
 <file path=ppt/slides/slide2.xml><?xml version="1.0" encoding="utf-8"?>
 <p:sld xmlns:a="http://schemas.openxmlformats.org/drawingml/2006/main" xmlns:r="http://schemas.openxmlformats.org/officeDocument/2006/relationships" xmlns:p="http://schemas.openxmlformats.org/presentationml/2006/main">
   <p:cSld>

</xml_diff>